<commit_message>
refactor: update verso-1a template for improved formatting and consistency
</commit_message>
<xml_diff>
--- a/public/templates/verso-1a.pptx
+++ b/public/templates/verso-1a.pptx
@@ -3141,7 +3141,7 @@
                 <a:spcPct val="100000"/>
               </a:lnSpc>
             </a:pPr>
-            <a:endParaRPr lang="en-US" sz="700" b="0" u="none" strike="noStrike">
+            <a:endParaRPr lang="en-US" sz="700" b="0" u="none" strike="noStrike" dirty="0">
               <a:solidFill>
                 <a:srgbClr val="000000"/>
               </a:solidFill>
@@ -3155,7 +3155,7 @@
                 <a:spcPct val="100000"/>
               </a:lnSpc>
             </a:pPr>
-            <a:endParaRPr lang="en-US" sz="700" b="0" u="none" strike="noStrike">
+            <a:endParaRPr lang="en-US" sz="700" b="0" u="none" strike="noStrike" dirty="0">
               <a:solidFill>
                 <a:srgbClr val="000000"/>
               </a:solidFill>
@@ -3169,7 +3169,7 @@
                 <a:spcPct val="100000"/>
               </a:lnSpc>
             </a:pPr>
-            <a:endParaRPr lang="en-US" sz="700" b="0" u="none" strike="noStrike">
+            <a:endParaRPr lang="en-US" sz="700" b="0" u="none" strike="noStrike" dirty="0">
               <a:solidFill>
                 <a:srgbClr val="000000"/>
               </a:solidFill>
@@ -3268,7 +3268,7 @@
                 </a:solidFill>
                 <a:latin typeface="Arial"/>
               </a:rPr>
-              <a:t>qualificação_profissional1]</a:t>
+              <a:t>qualificacao_profissional1]</a:t>
             </a:r>
             <a:endParaRPr lang="pt-BR" sz="800" b="0" u="none" strike="noStrike" dirty="0">
               <a:solidFill>
@@ -3321,7 +3321,7 @@
                 </a:solidFill>
                 <a:latin typeface="Arial"/>
               </a:rPr>
-              <a:t>qualificação1</a:t>
+              <a:t>qualificacao1</a:t>
             </a:r>
             <a:r>
               <a:rPr lang="pt-BR" sz="800" b="0" u="none" strike="noStrike" dirty="0">

</xml_diff>

<commit_message>
chore: update verso-1a.pptx template file
</commit_message>
<xml_diff>
--- a/public/templates/verso-1a.pptx
+++ b/public/templates/verso-1a.pptx
@@ -3081,8 +3081,8 @@
         </p:nvSpPr>
         <p:spPr>
           <a:xfrm>
-            <a:off x="6878160" y="1698480"/>
-            <a:ext cx="2230200" cy="998820"/>
+            <a:off x="6878159" y="1698480"/>
+            <a:ext cx="2507333" cy="983431"/>
           </a:xfrm>
           <a:prstGeom prst="rect">
             <a:avLst/>
@@ -3108,7 +3108,7 @@
           <a:fontRef idx="minor"/>
         </p:style>
         <p:txBody>
-          <a:bodyPr lIns="90000" tIns="45000" rIns="90000" bIns="45000" anchor="t">
+          <a:bodyPr wrap="square" lIns="90000" tIns="45000" rIns="90000" bIns="45000" anchor="t">
             <a:spAutoFit/>
           </a:bodyPr>
           <a:lstStyle/>
@@ -3119,7 +3119,7 @@
               </a:lnSpc>
             </a:pPr>
             <a:r>
-              <a:rPr lang="pt-BR" sz="700" b="1" dirty="0">
+              <a:rPr lang="pt-BR" sz="800" b="1" dirty="0">
                 <a:solidFill>
                   <a:schemeClr val="dk1"/>
                 </a:solidFill>
@@ -3127,7 +3127,7 @@
               </a:rPr>
               <a:t>[assinatura_1]</a:t>
             </a:r>
-            <a:endParaRPr lang="en-US" sz="700" b="0" u="none" strike="noStrike" dirty="0">
+            <a:endParaRPr lang="en-US" sz="800" b="0" u="none" strike="noStrike" dirty="0">
               <a:solidFill>
                 <a:schemeClr val="dk1"/>
               </a:solidFill>
@@ -3155,12 +3155,163 @@
                 <a:spcPct val="100000"/>
               </a:lnSpc>
             </a:pPr>
+            <a:r>
+              <a:rPr lang="pt-BR" sz="700" b="0" u="none" strike="noStrike" dirty="0">
+                <a:solidFill>
+                  <a:srgbClr val="000000"/>
+                </a:solidFill>
+                <a:uFillTx/>
+                <a:latin typeface="Arial"/>
+              </a:rPr>
+              <a:t>_________________________________________</a:t>
+            </a:r>
             <a:endParaRPr lang="en-US" sz="700" b="0" u="none" strike="noStrike" dirty="0">
               <a:solidFill>
                 <a:srgbClr val="000000"/>
               </a:solidFill>
               <a:uFillTx/>
               <a:latin typeface="Arial"/>
+            </a:endParaRPr>
+          </a:p>
+          <a:p>
+            <a:pPr algn="ctr" defTabSz="914400">
+              <a:lnSpc>
+                <a:spcPct val="100000"/>
+              </a:lnSpc>
+            </a:pPr>
+            <a:r>
+              <a:rPr lang="pt-BR" sz="800" b="1" u="none" strike="noStrike" dirty="0">
+                <a:solidFill>
+                  <a:srgbClr val="000000"/>
+                </a:solidFill>
+                <a:uFillTx/>
+                <a:latin typeface="Arial"/>
+              </a:rPr>
+              <a:t>[</a:t>
+            </a:r>
+            <a:r>
+              <a:rPr lang="pt-BR" sz="800" b="1" dirty="0">
+                <a:solidFill>
+                  <a:srgbClr val="000000"/>
+                </a:solidFill>
+                <a:latin typeface="Arial"/>
+              </a:rPr>
+              <a:t>nome1]</a:t>
+            </a:r>
+            <a:r>
+              <a:rPr lang="pt-BR" sz="800" b="1" u="none" strike="noStrike" dirty="0">
+                <a:solidFill>
+                  <a:srgbClr val="000000"/>
+                </a:solidFill>
+                <a:uFillTx/>
+                <a:latin typeface="Arial"/>
+              </a:rPr>
+              <a:t> </a:t>
+            </a:r>
+            <a:endParaRPr lang="en-US" sz="800" b="0" u="none" strike="noStrike" dirty="0">
+              <a:solidFill>
+                <a:srgbClr val="000000"/>
+              </a:solidFill>
+              <a:uFillTx/>
+              <a:latin typeface="Arial"/>
+              <a:cs typeface="Arial"/>
+            </a:endParaRPr>
+          </a:p>
+          <a:p>
+            <a:pPr algn="ctr" defTabSz="914400">
+              <a:lnSpc>
+                <a:spcPct val="100000"/>
+              </a:lnSpc>
+            </a:pPr>
+            <a:r>
+              <a:rPr lang="pt-BR" sz="700" b="0" u="none" strike="noStrike" dirty="0">
+                <a:solidFill>
+                  <a:srgbClr val="000000"/>
+                </a:solidFill>
+                <a:uFillTx/>
+                <a:latin typeface="Arial"/>
+              </a:rPr>
+              <a:t>[</a:t>
+            </a:r>
+            <a:r>
+              <a:rPr lang="pt-BR" sz="700" dirty="0">
+                <a:solidFill>
+                  <a:srgbClr val="000000"/>
+                </a:solidFill>
+                <a:latin typeface="Arial"/>
+              </a:rPr>
+              <a:t>qualificacao_profissional1]</a:t>
+            </a:r>
+            <a:endParaRPr lang="pt-BR" sz="700" b="0" u="none" strike="noStrike" dirty="0">
+              <a:solidFill>
+                <a:srgbClr val="000000"/>
+              </a:solidFill>
+              <a:uFillTx/>
+              <a:latin typeface="Arial"/>
+              <a:cs typeface="Arial"/>
+            </a:endParaRPr>
+          </a:p>
+          <a:p>
+            <a:pPr algn="ctr" defTabSz="914400">
+              <a:lnSpc>
+                <a:spcPct val="100000"/>
+              </a:lnSpc>
+            </a:pPr>
+            <a:r>
+              <a:rPr lang="pt-BR" sz="700" b="0" u="none" strike="noStrike" dirty="0">
+                <a:solidFill>
+                  <a:srgbClr val="000000"/>
+                </a:solidFill>
+                <a:uFillTx/>
+                <a:latin typeface="Arial"/>
+              </a:rPr>
+              <a:t> [</a:t>
+            </a:r>
+            <a:r>
+              <a:rPr lang="pt-BR" sz="700" dirty="0">
+                <a:solidFill>
+                  <a:srgbClr val="000000"/>
+                </a:solidFill>
+                <a:latin typeface="Arial"/>
+              </a:rPr>
+              <a:t>registro</a:t>
+            </a:r>
+            <a:r>
+              <a:rPr lang="pt-BR" sz="700" b="0" u="none" strike="noStrike" dirty="0">
+                <a:solidFill>
+                  <a:srgbClr val="000000"/>
+                </a:solidFill>
+                <a:uFillTx/>
+                <a:latin typeface="Arial"/>
+              </a:rPr>
+              <a:t>_</a:t>
+            </a:r>
+            <a:r>
+              <a:rPr lang="pt-BR" sz="700" dirty="0">
+                <a:solidFill>
+                  <a:srgbClr val="000000"/>
+                </a:solidFill>
+                <a:latin typeface="Arial"/>
+              </a:rPr>
+              <a:t>qualificacao1</a:t>
+            </a:r>
+            <a:r>
+              <a:rPr lang="pt-BR" sz="700" b="0" u="none" strike="noStrike" dirty="0">
+                <a:solidFill>
+                  <a:srgbClr val="000000"/>
+                </a:solidFill>
+                <a:uFillTx/>
+                <a:latin typeface="Arial"/>
+              </a:rPr>
+              <a:t>]</a:t>
+            </a:r>
+            <a:endParaRPr lang="en-US" sz="700" b="0" u="none" strike="noStrike" dirty="0">
+              <a:solidFill>
+                <a:srgbClr val="000000"/>
+              </a:solidFill>
+              <a:uFillTx/>
+              <a:latin typeface="Arial"/>
+              <a:cs typeface="Arial"/>
             </a:endParaRPr>
           </a:p>
           <a:p>
@@ -3183,16 +3334,6 @@
                 <a:spcPct val="100000"/>
               </a:lnSpc>
             </a:pPr>
-            <a:r>
-              <a:rPr lang="pt-BR" sz="700" b="0" u="none" strike="noStrike" dirty="0">
-                <a:solidFill>
-                  <a:srgbClr val="000000"/>
-                </a:solidFill>
-                <a:uFillTx/>
-                <a:latin typeface="Arial"/>
-              </a:rPr>
-              <a:t>_________________________________________</a:t>
-            </a:r>
             <a:endParaRPr lang="en-US" sz="700" b="0" u="none" strike="noStrike" dirty="0">
               <a:solidFill>
                 <a:srgbClr val="000000"/>
@@ -3201,147 +3342,6 @@
               <a:latin typeface="Arial"/>
             </a:endParaRPr>
           </a:p>
-          <a:p>
-            <a:pPr algn="ctr" defTabSz="914400">
-              <a:lnSpc>
-                <a:spcPct val="100000"/>
-              </a:lnSpc>
-            </a:pPr>
-            <a:r>
-              <a:rPr lang="pt-BR" sz="800" b="1" u="none" strike="noStrike" dirty="0">
-                <a:solidFill>
-                  <a:srgbClr val="000000"/>
-                </a:solidFill>
-                <a:uFillTx/>
-                <a:latin typeface="Arial"/>
-              </a:rPr>
-              <a:t>[</a:t>
-            </a:r>
-            <a:r>
-              <a:rPr lang="pt-BR" sz="800" b="1" dirty="0">
-                <a:solidFill>
-                  <a:srgbClr val="000000"/>
-                </a:solidFill>
-                <a:latin typeface="Arial"/>
-              </a:rPr>
-              <a:t>nome1]</a:t>
-            </a:r>
-            <a:r>
-              <a:rPr lang="pt-BR" sz="800" b="1" u="none" strike="noStrike" dirty="0">
-                <a:solidFill>
-                  <a:srgbClr val="000000"/>
-                </a:solidFill>
-                <a:uFillTx/>
-                <a:latin typeface="Arial"/>
-              </a:rPr>
-              <a:t> </a:t>
-            </a:r>
-            <a:endParaRPr lang="en-US" sz="800" b="0" u="none" strike="noStrike" dirty="0">
-              <a:solidFill>
-                <a:srgbClr val="000000"/>
-              </a:solidFill>
-              <a:uFillTx/>
-              <a:latin typeface="Arial"/>
-              <a:cs typeface="Arial"/>
-            </a:endParaRPr>
-          </a:p>
-          <a:p>
-            <a:pPr algn="ctr" defTabSz="914400">
-              <a:lnSpc>
-                <a:spcPct val="100000"/>
-              </a:lnSpc>
-            </a:pPr>
-            <a:r>
-              <a:rPr lang="pt-BR" sz="800" b="0" u="none" strike="noStrike" dirty="0">
-                <a:solidFill>
-                  <a:srgbClr val="000000"/>
-                </a:solidFill>
-                <a:uFillTx/>
-                <a:latin typeface="Arial"/>
-              </a:rPr>
-              <a:t>[</a:t>
-            </a:r>
-            <a:r>
-              <a:rPr lang="pt-BR" sz="800" dirty="0">
-                <a:solidFill>
-                  <a:srgbClr val="000000"/>
-                </a:solidFill>
-                <a:latin typeface="Arial"/>
-              </a:rPr>
-              <a:t>qualificacao_profissional1]</a:t>
-            </a:r>
-            <a:endParaRPr lang="pt-BR" sz="800" b="0" u="none" strike="noStrike" dirty="0">
-              <a:solidFill>
-                <a:srgbClr val="000000"/>
-              </a:solidFill>
-              <a:uFillTx/>
-              <a:latin typeface="Arial"/>
-              <a:cs typeface="Arial"/>
-            </a:endParaRPr>
-          </a:p>
-          <a:p>
-            <a:pPr algn="ctr" defTabSz="914400">
-              <a:lnSpc>
-                <a:spcPct val="100000"/>
-              </a:lnSpc>
-            </a:pPr>
-            <a:r>
-              <a:rPr lang="pt-BR" sz="800" b="0" u="none" strike="noStrike" dirty="0">
-                <a:solidFill>
-                  <a:srgbClr val="000000"/>
-                </a:solidFill>
-                <a:uFillTx/>
-                <a:latin typeface="Arial"/>
-              </a:rPr>
-              <a:t> [</a:t>
-            </a:r>
-            <a:r>
-              <a:rPr lang="pt-BR" sz="800" dirty="0">
-                <a:solidFill>
-                  <a:srgbClr val="000000"/>
-                </a:solidFill>
-                <a:latin typeface="Arial"/>
-              </a:rPr>
-              <a:t>registro</a:t>
-            </a:r>
-            <a:r>
-              <a:rPr lang="pt-BR" sz="800" b="0" u="none" strike="noStrike" dirty="0">
-                <a:solidFill>
-                  <a:srgbClr val="000000"/>
-                </a:solidFill>
-                <a:uFillTx/>
-                <a:latin typeface="Arial"/>
-              </a:rPr>
-              <a:t>_</a:t>
-            </a:r>
-            <a:r>
-              <a:rPr lang="pt-BR" sz="800" dirty="0">
-                <a:solidFill>
-                  <a:srgbClr val="000000"/>
-                </a:solidFill>
-                <a:latin typeface="Arial"/>
-              </a:rPr>
-              <a:t>qualificacao1</a:t>
-            </a:r>
-            <a:r>
-              <a:rPr lang="pt-BR" sz="800" b="0" u="none" strike="noStrike" dirty="0">
-                <a:solidFill>
-                  <a:srgbClr val="000000"/>
-                </a:solidFill>
-                <a:uFillTx/>
-                <a:latin typeface="Arial"/>
-              </a:rPr>
-              <a:t>]</a:t>
-            </a:r>
-            <a:endParaRPr lang="en-US" sz="800" b="0" u="none" strike="noStrike" dirty="0">
-              <a:solidFill>
-                <a:srgbClr val="000000"/>
-              </a:solidFill>
-              <a:uFillTx/>
-              <a:latin typeface="Arial"/>
-              <a:cs typeface="Arial"/>
-            </a:endParaRPr>
-          </a:p>
         </p:txBody>
       </p:sp>
       <p:graphicFrame>
@@ -3351,7 +3351,7 @@
           <p:nvPr>
             <p:extLst>
               <p:ext uri="{D42A27DB-BD31-4B8C-83A1-F6EECF244321}">
-                <p14:modId xmlns:p14="http://schemas.microsoft.com/office/powerpoint/2010/main" val="856349569"/>
+                <p14:modId xmlns:p14="http://schemas.microsoft.com/office/powerpoint/2010/main" val="1166343646"/>
               </p:ext>
             </p:extLst>
           </p:nvPr>
@@ -3559,7 +3559,7 @@
                         </a:lnSpc>
                       </a:pPr>
                       <a:r>
-                        <a:rPr lang="pt-BR" sz="1200" b="0" u="none" strike="noStrike" dirty="0">
+                        <a:rPr lang="pt-BR" sz="1000" b="0" u="none" strike="noStrike" dirty="0">
                           <a:solidFill>
                             <a:srgbClr val="000000"/>
                           </a:solidFill>
@@ -3569,7 +3569,7 @@
                         <a:t>[</a:t>
                       </a:r>
                       <a:r>
-                        <a:rPr lang="pt-BR" sz="1000" b="0" i="0" u="none" strike="noStrike" noProof="0" err="1">
+                        <a:rPr lang="pt-BR" sz="1000" b="0" i="0" u="none" strike="noStrike" noProof="0" dirty="0" err="1">
                           <a:solidFill>
                             <a:srgbClr val="000000"/>
                           </a:solidFill>
@@ -3579,7 +3579,7 @@
                         <a:t>conteudo</a:t>
                       </a:r>
                       <a:r>
-                        <a:rPr lang="pt-BR" sz="1200" b="0" u="none" strike="noStrike" dirty="0">
+                        <a:rPr lang="pt-BR" sz="1000" b="0" u="none" strike="noStrike" dirty="0">
                           <a:solidFill>
                             <a:srgbClr val="000000"/>
                           </a:solidFill>
@@ -3588,7 +3588,7 @@
                         </a:rPr>
                         <a:t>]</a:t>
                       </a:r>
-                      <a:endParaRPr lang="en-US" sz="1200" b="0" u="none" strike="noStrike">
+                      <a:endParaRPr lang="en-US" sz="1000" b="0" u="none" strike="noStrike" dirty="0">
                         <a:solidFill>
                           <a:srgbClr val="000000"/>
                         </a:solidFill>

</xml_diff>

<commit_message>
feat: add new presentation templates and update existing ones for enhanced quality
</commit_message>
<xml_diff>
--- a/public/templates/verso-1a.pptx
+++ b/public/templates/verso-1a.pptx
@@ -3081,7 +3081,7 @@
         </p:nvSpPr>
         <p:spPr>
           <a:xfrm>
-            <a:off x="6878159" y="1698480"/>
+            <a:off x="6878159" y="1522070"/>
             <a:ext cx="2507333" cy="983431"/>
           </a:xfrm>
           <a:prstGeom prst="rect">
@@ -3351,14 +3351,14 @@
           <p:nvPr>
             <p:extLst>
               <p:ext uri="{D42A27DB-BD31-4B8C-83A1-F6EECF244321}">
-                <p14:modId xmlns:p14="http://schemas.microsoft.com/office/powerpoint/2010/main" val="1166343646"/>
+                <p14:modId xmlns:p14="http://schemas.microsoft.com/office/powerpoint/2010/main" val="3718596196"/>
               </p:ext>
             </p:extLst>
           </p:nvPr>
         </p:nvGraphicFramePr>
         <p:xfrm>
-          <a:off x="315720" y="1707480"/>
-          <a:ext cx="6467400" cy="3813858"/>
+          <a:off x="315721" y="1522070"/>
+          <a:ext cx="6467400" cy="4017937"/>
         </p:xfrm>
         <a:graphic>
           <a:graphicData uri="http://schemas.openxmlformats.org/drawingml/2006/table">
@@ -3373,7 +3373,7 @@
                   </a:extLst>
                 </a:gridCol>
               </a:tblGrid>
-              <a:tr h="326520">
+              <a:tr h="343992">
                 <a:tc>
                   <a:txBody>
                     <a:bodyPr/>
@@ -3547,7 +3547,7 @@
                   </a:ext>
                 </a:extLst>
               </a:tr>
-              <a:tr h="3487338">
+              <a:tr h="3673945">
                 <a:tc>
                   <a:txBody>
                     <a:bodyPr/>
@@ -3558,36 +3558,6 @@
                           <a:spcPct val="100000"/>
                         </a:lnSpc>
                       </a:pPr>
-                      <a:r>
-                        <a:rPr lang="pt-BR" sz="1000" b="0" u="none" strike="noStrike" dirty="0">
-                          <a:solidFill>
-                            <a:srgbClr val="000000"/>
-                          </a:solidFill>
-                          <a:uFillTx/>
-                          <a:latin typeface="Arial"/>
-                        </a:rPr>
-                        <a:t>[</a:t>
-                      </a:r>
-                      <a:r>
-                        <a:rPr lang="pt-BR" sz="1000" b="0" i="0" u="none" strike="noStrike" noProof="0" dirty="0" err="1">
-                          <a:solidFill>
-                            <a:srgbClr val="000000"/>
-                          </a:solidFill>
-                          <a:uFillTx/>
-                          <a:latin typeface="Arial"/>
-                        </a:rPr>
-                        <a:t>conteudo</a:t>
-                      </a:r>
-                      <a:r>
-                        <a:rPr lang="pt-BR" sz="1000" b="0" u="none" strike="noStrike" dirty="0">
-                          <a:solidFill>
-                            <a:srgbClr val="000000"/>
-                          </a:solidFill>
-                          <a:uFillTx/>
-                          <a:latin typeface="Arial"/>
-                        </a:rPr>
-                        <a:t>]</a:t>
-                      </a:r>
                       <a:endParaRPr lang="en-US" sz="1000" b="0" u="none" strike="noStrike" dirty="0">
                         <a:solidFill>
                           <a:srgbClr val="000000"/>
@@ -3635,6 +3605,49 @@
           </a:graphicData>
         </a:graphic>
       </p:graphicFrame>
+      <p:sp>
+        <p:nvSpPr>
+          <p:cNvPr id="2" name="CaixaDeTexto 1">
+            <a:extLst>
+              <a:ext uri="{FF2B5EF4-FFF2-40B4-BE49-F238E27FC236}">
+                <a16:creationId xmlns:a16="http://schemas.microsoft.com/office/drawing/2014/main" id="{3AD7D410-8FE8-4928-D594-CF90CAB349F6}"/>
+              </a:ext>
+            </a:extLst>
+          </p:cNvPr>
+          <p:cNvSpPr txBox="1"/>
+          <p:nvPr/>
+        </p:nvSpPr>
+        <p:spPr>
+          <a:xfrm>
+            <a:off x="315721" y="1868008"/>
+            <a:ext cx="6467399" cy="3672000"/>
+          </a:xfrm>
+          <a:prstGeom prst="rect">
+            <a:avLst/>
+          </a:prstGeom>
+          <a:noFill/>
+        </p:spPr>
+        <p:txBody>
+          <a:bodyPr wrap="square" rtlCol="0">
+            <a:spAutoFit/>
+          </a:bodyPr>
+          <a:lstStyle/>
+          <a:p>
+            <a:r>
+              <a:rPr lang="pt-BR" sz="1000" dirty="0"/>
+              <a:t>[</a:t>
+            </a:r>
+            <a:r>
+              <a:rPr lang="pt-BR" sz="1000" dirty="0" err="1"/>
+              <a:t>conteudo</a:t>
+            </a:r>
+            <a:r>
+              <a:rPr lang="pt-BR" sz="1000" dirty="0"/>
+              <a:t>]</a:t>
+            </a:r>
+          </a:p>
+        </p:txBody>
+      </p:sp>
     </p:spTree>
   </p:cSld>
   <p:clrMapOvr>

</xml_diff>